<commit_message>
chapter 2 code qand slides added
</commit_message>
<xml_diff>
--- a/Slides/Visual Programming with C#.pptx
+++ b/Slides/Visual Programming with C#.pptx
@@ -8,7 +8,7 @@
     <p:notesMasterId r:id="rId4"/>
   </p:notesMasterIdLst>
   <p:handoutMasterIdLst>
-    <p:handoutMasterId r:id="rId17"/>
+    <p:handoutMasterId r:id="rId19"/>
   </p:handoutMasterIdLst>
   <p:sldIdLst>
     <p:sldId id="256" r:id="rId3"/>
@@ -24,18 +24,20 @@
     <p:sldId id="279" r:id="rId14"/>
     <p:sldId id="273" r:id="rId15"/>
     <p:sldId id="275" r:id="rId16"/>
+    <p:sldId id="283" r:id="rId17"/>
+    <p:sldId id="282" r:id="rId18"/>
   </p:sldIdLst>
   <p:sldSz cx="12192000" cy="6858000"/>
   <p:notesSz cx="6858000" cy="9144000"/>
   <p:embeddedFontLst>
     <p:embeddedFont>
       <p:font typeface="Calibri" panose="020F0502020204030204"/>
-      <p:regular r:id="rId21"/>
+      <p:regular r:id="rId23"/>
     </p:embeddedFont>
     <p:embeddedFont>
       <p:font typeface="Catamaran"/>
-      <p:regular r:id="rId22"/>
-      <p:bold r:id="rId23"/>
+      <p:regular r:id="rId24"/>
+      <p:bold r:id="rId25"/>
     </p:embeddedFont>
   </p:embeddedFontLst>
   <p:defaultTextStyle>
@@ -1161,6 +1163,105 @@
 </file>
 
 <file path=ppt/notesSlides/notesSlide12.xml><?xml version="1.0" encoding="utf-8"?>
+<p:notes xmlns:a="http://schemas.openxmlformats.org/drawingml/2006/main" xmlns:r="http://schemas.openxmlformats.org/officeDocument/2006/relationships" xmlns:p="http://schemas.openxmlformats.org/presentationml/2006/main" showMasterPhAnim="0" showMasterSp="0">
+  <p:cSld>
+    <p:spTree>
+      <p:nvGrpSpPr>
+        <p:cNvPr id="121" name="Shape 121"/>
+        <p:cNvGrpSpPr/>
+        <p:nvPr/>
+      </p:nvGrpSpPr>
+      <p:grpSpPr>
+        <a:xfrm>
+          <a:off x="0" y="0"/>
+          <a:ext cx="0" cy="0"/>
+          <a:chOff x="0" y="0"/>
+          <a:chExt cx="0" cy="0"/>
+        </a:xfrm>
+      </p:grpSpPr>
+      <p:sp>
+        <p:nvSpPr>
+          <p:cNvPr id="122" name="Google Shape;122;g3262c951070_0_130:notes"/>
+          <p:cNvSpPr/>
+          <p:nvPr>
+            <p:ph type="sldImg" idx="2"/>
+          </p:nvPr>
+        </p:nvSpPr>
+        <p:spPr>
+          <a:xfrm>
+            <a:off x="1143225" y="685800"/>
+            <a:ext cx="4572300" cy="3429000"/>
+          </a:xfrm>
+          <a:custGeom>
+            <a:avLst/>
+            <a:gdLst/>
+            <a:ahLst/>
+            <a:cxnLst/>
+            <a:rect l="l" t="t" r="r" b="b"/>
+            <a:pathLst>
+              <a:path w="120000" h="120000" extrusionOk="0">
+                <a:moveTo>
+                  <a:pt x="0" y="0"/>
+                </a:moveTo>
+                <a:lnTo>
+                  <a:pt x="120000" y="0"/>
+                </a:lnTo>
+                <a:lnTo>
+                  <a:pt x="120000" y="120000"/>
+                </a:lnTo>
+                <a:lnTo>
+                  <a:pt x="0" y="120000"/>
+                </a:lnTo>
+                <a:close/>
+              </a:path>
+            </a:pathLst>
+          </a:custGeom>
+        </p:spPr>
+      </p:sp>
+      <p:sp>
+        <p:nvSpPr>
+          <p:cNvPr id="123" name="Google Shape;123;g3262c951070_0_130:notes"/>
+          <p:cNvSpPr txBox="1"/>
+          <p:nvPr>
+            <p:ph type="body" idx="1"/>
+          </p:nvPr>
+        </p:nvSpPr>
+        <p:spPr>
+          <a:xfrm>
+            <a:off x="685800" y="4343400"/>
+            <a:ext cx="5486400" cy="4114800"/>
+          </a:xfrm>
+          <a:prstGeom prst="rect">
+            <a:avLst/>
+          </a:prstGeom>
+        </p:spPr>
+        <p:txBody>
+          <a:bodyPr spcFirstLastPara="1" wrap="square" lIns="91425" tIns="91425" rIns="91425" bIns="91425" anchor="t" anchorCtr="0">
+            <a:noAutofit/>
+          </a:bodyPr>
+          <a:lstStyle/>
+          <a:p>
+            <a:pPr marL="0" lvl="0" indent="0" algn="l" rtl="0">
+              <a:spcBef>
+                <a:spcPts val="0"/>
+              </a:spcBef>
+              <a:spcAft>
+                <a:spcPts val="0"/>
+              </a:spcAft>
+              <a:buNone/>
+            </a:pPr>
+          </a:p>
+        </p:txBody>
+      </p:sp>
+    </p:spTree>
+  </p:cSld>
+  <p:clrMapOvr>
+    <a:masterClrMapping/>
+  </p:clrMapOvr>
+</p:notes>
+</file>
+
+<file path=ppt/notesSlides/notesSlide13.xml><?xml version="1.0" encoding="utf-8"?>
 <p:notes xmlns:a="http://schemas.openxmlformats.org/drawingml/2006/main" xmlns:r="http://schemas.openxmlformats.org/officeDocument/2006/relationships" xmlns:p="http://schemas.openxmlformats.org/presentationml/2006/main" showMasterPhAnim="0" showMasterSp="0">
   <p:cSld>
     <p:spTree>
@@ -13746,6 +13847,263 @@
                 <a:schemeClr val="dk2"/>
               </a:solidFill>
             </a:endParaRPr>
+          </a:p>
+        </p:txBody>
+      </p:sp>
+    </p:spTree>
+  </p:cSld>
+  <p:clrMapOvr>
+    <a:masterClrMapping/>
+  </p:clrMapOvr>
+</p:sld>
+</file>
+
+<file path=ppt/slides/slide14.xml><?xml version="1.0" encoding="utf-8"?>
+<p:sld xmlns:a="http://schemas.openxmlformats.org/drawingml/2006/main" xmlns:r="http://schemas.openxmlformats.org/officeDocument/2006/relationships" xmlns:p="http://schemas.openxmlformats.org/presentationml/2006/main">
+  <p:cSld>
+    <p:bg>
+      <p:bgPr>
+        <a:solidFill>
+          <a:schemeClr val="lt2"/>
+        </a:solidFill>
+        <a:effectLst/>
+      </p:bgPr>
+    </p:bg>
+    <p:spTree>
+      <p:nvGrpSpPr>
+        <p:cNvPr id="124" name="Shape 124"/>
+        <p:cNvGrpSpPr/>
+        <p:nvPr/>
+      </p:nvGrpSpPr>
+      <p:grpSpPr>
+        <a:xfrm>
+          <a:off x="0" y="0"/>
+          <a:ext cx="0" cy="0"/>
+          <a:chOff x="0" y="0"/>
+          <a:chExt cx="0" cy="0"/>
+        </a:xfrm>
+      </p:grpSpPr>
+      <p:sp>
+        <p:nvSpPr>
+          <p:cNvPr id="125" name="Google Shape;125;g3262c951070_0_130"/>
+          <p:cNvSpPr txBox="1"/>
+          <p:nvPr>
+            <p:ph type="title"/>
+          </p:nvPr>
+        </p:nvSpPr>
+        <p:spPr>
+          <a:xfrm>
+            <a:off x="137900" y="455992"/>
+            <a:ext cx="11360700" cy="763500"/>
+          </a:xfrm>
+          <a:prstGeom prst="rect">
+            <a:avLst/>
+          </a:prstGeom>
+        </p:spPr>
+        <p:txBody>
+          <a:bodyPr spcFirstLastPara="1" wrap="square" lIns="121900" tIns="121900" rIns="121900" bIns="121900" anchor="t" anchorCtr="0">
+            <a:normAutofit/>
+          </a:bodyPr>
+          <a:lstStyle/>
+          <a:p>
+            <a:pPr marL="0" lvl="0" indent="0" algn="l" rtl="0">
+              <a:spcBef>
+                <a:spcPts val="0"/>
+              </a:spcBef>
+              <a:spcAft>
+                <a:spcPts val="0"/>
+              </a:spcAft>
+              <a:buClr>
+                <a:schemeClr val="dk1"/>
+              </a:buClr>
+              <a:buFont typeface="Arial" panose="020B0604020202020204"/>
+              <a:buNone/>
+            </a:pPr>
+            <a:r>
+              <a:rPr lang="en-US" sz="3200" b="1"/>
+              <a:t>CHAPTER TWO </a:t>
+            </a:r>
+            <a:endParaRPr lang="en-US" sz="3200" b="1"/>
+          </a:p>
+        </p:txBody>
+      </p:sp>
+      <p:sp>
+        <p:nvSpPr>
+          <p:cNvPr id="126" name="Google Shape;126;g3262c951070_0_130"/>
+          <p:cNvSpPr txBox="1"/>
+          <p:nvPr>
+            <p:ph type="body" idx="1"/>
+          </p:nvPr>
+        </p:nvSpPr>
+        <p:spPr>
+          <a:xfrm>
+            <a:off x="649224" y="1622500"/>
+            <a:ext cx="10927200" cy="4465200"/>
+          </a:xfrm>
+          <a:prstGeom prst="rect">
+            <a:avLst/>
+          </a:prstGeom>
+        </p:spPr>
+        <p:txBody>
+          <a:bodyPr spcFirstLastPara="1" wrap="square" lIns="121900" tIns="121900" rIns="121900" bIns="121900" anchor="t" anchorCtr="0">
+            <a:normAutofit/>
+          </a:bodyPr>
+          <a:lstStyle/>
+          <a:p>
+            <a:pPr marL="0" lvl="0" indent="0" algn="l" rtl="0">
+              <a:spcBef>
+                <a:spcPts val="0"/>
+              </a:spcBef>
+              <a:spcAft>
+                <a:spcPts val="0"/>
+              </a:spcAft>
+              <a:buNone/>
+            </a:pPr>
+            <a:endParaRPr sz="1100">
+              <a:solidFill>
+                <a:schemeClr val="dk1"/>
+              </a:solidFill>
+            </a:endParaRPr>
+          </a:p>
+          <a:p>
+            <a:pPr marL="0" lvl="0" indent="0" algn="l" rtl="0">
+              <a:spcBef>
+                <a:spcPts val="0"/>
+              </a:spcBef>
+              <a:spcAft>
+                <a:spcPts val="0"/>
+              </a:spcAft>
+              <a:buNone/>
+            </a:pPr>
+            <a:endParaRPr sz="1100">
+              <a:solidFill>
+                <a:schemeClr val="dk1"/>
+              </a:solidFill>
+            </a:endParaRPr>
+          </a:p>
+        </p:txBody>
+      </p:sp>
+      <p:sp>
+        <p:nvSpPr>
+          <p:cNvPr id="127" name="Google Shape;127;g3262c951070_0_130"/>
+          <p:cNvSpPr txBox="1"/>
+          <p:nvPr/>
+        </p:nvSpPr>
+        <p:spPr>
+          <a:xfrm>
+            <a:off x="245110" y="1231900"/>
+            <a:ext cx="11894820" cy="5246370"/>
+          </a:xfrm>
+          <a:prstGeom prst="rect">
+            <a:avLst/>
+          </a:prstGeom>
+          <a:noFill/>
+          <a:ln>
+            <a:noFill/>
+          </a:ln>
+        </p:spPr>
+        <p:txBody>
+          <a:bodyPr spcFirstLastPara="1" wrap="square" lIns="91425" tIns="91425" rIns="91425" bIns="91425" anchor="t" anchorCtr="0">
+            <a:noAutofit/>
+          </a:bodyPr>
+          <a:lstStyle/>
+          <a:p>
+            <a:pPr marL="0" lvl="0" indent="0" algn="l" rtl="0">
+              <a:spcBef>
+                <a:spcPts val="0"/>
+              </a:spcBef>
+              <a:spcAft>
+                <a:spcPts val="0"/>
+              </a:spcAft>
+              <a:buNone/>
+            </a:pPr>
+            <a:endParaRPr sz="1800">
+              <a:solidFill>
+                <a:schemeClr val="dk2"/>
+              </a:solidFill>
+            </a:endParaRPr>
+          </a:p>
+          <a:p>
+            <a:pPr marL="0" lvl="0" indent="0" algn="l" rtl="0">
+              <a:spcBef>
+                <a:spcPts val="0"/>
+              </a:spcBef>
+              <a:spcAft>
+                <a:spcPts val="0"/>
+              </a:spcAft>
+              <a:buNone/>
+            </a:pPr>
+            <a:endParaRPr sz="1800">
+              <a:solidFill>
+                <a:schemeClr val="dk2"/>
+              </a:solidFill>
+            </a:endParaRPr>
+          </a:p>
+          <a:p>
+            <a:pPr marL="0" lvl="0" indent="0" algn="l" rtl="0">
+              <a:spcBef>
+                <a:spcPts val="0"/>
+              </a:spcBef>
+              <a:spcAft>
+                <a:spcPts val="0"/>
+              </a:spcAft>
+              <a:buNone/>
+            </a:pPr>
+            <a:endParaRPr sz="1800">
+              <a:solidFill>
+                <a:schemeClr val="dk2"/>
+              </a:solidFill>
+            </a:endParaRPr>
+          </a:p>
+        </p:txBody>
+      </p:sp>
+    </p:spTree>
+  </p:cSld>
+  <p:clrMapOvr>
+    <a:masterClrMapping/>
+  </p:clrMapOvr>
+</p:sld>
+</file>
+
+<file path=ppt/slides/slide15.xml><?xml version="1.0" encoding="utf-8"?>
+<p:sld xmlns:a="http://schemas.openxmlformats.org/drawingml/2006/main" xmlns:r="http://schemas.openxmlformats.org/officeDocument/2006/relationships" xmlns:p="http://schemas.openxmlformats.org/presentationml/2006/main">
+  <p:cSld>
+    <p:spTree>
+      <p:nvGrpSpPr>
+        <p:cNvPr id="1" name=""/>
+        <p:cNvGrpSpPr/>
+        <p:nvPr/>
+      </p:nvGrpSpPr>
+      <p:grpSpPr/>
+      <p:sp>
+        <p:nvSpPr>
+          <p:cNvPr id="2" name="Title 1"/>
+          <p:cNvSpPr/>
+          <p:nvPr>
+            <p:ph type="title"/>
+          </p:nvPr>
+        </p:nvSpPr>
+        <p:spPr/>
+        <p:txBody>
+          <a:bodyPr/>
+          <a:p>
+            <a:endParaRPr lang="en-GB" altLang="en-US"/>
+          </a:p>
+        </p:txBody>
+      </p:sp>
+      <p:sp>
+        <p:nvSpPr>
+          <p:cNvPr id="3" name="Text Placeholder 2"/>
+          <p:cNvSpPr/>
+          <p:nvPr>
+            <p:ph type="body" idx="1"/>
+          </p:nvPr>
+        </p:nvSpPr>
+        <p:spPr/>
+        <p:txBody>
+          <a:bodyPr/>
+          <a:p>
+            <a:endParaRPr lang="en-GB" altLang="en-US"/>
           </a:p>
         </p:txBody>
       </p:sp>

</xml_diff>